<commit_message>
finished l2 started l3
</commit_message>
<xml_diff>
--- a/Lessons/Lesson 2/Building a calculator.pptx
+++ b/Lessons/Lesson 2/Building a calculator.pptx
@@ -5,7 +5,7 @@
     <p:sldMasterId id="2147483648" r:id="rId1"/>
   </p:sldMasterIdLst>
   <p:notesMasterIdLst>
-    <p:notesMasterId r:id="rId17"/>
+    <p:notesMasterId r:id="rId19"/>
   </p:notesMasterIdLst>
   <p:sldIdLst>
     <p:sldId id="265" r:id="rId2"/>
@@ -23,6 +23,8 @@
     <p:sldId id="272" r:id="rId14"/>
     <p:sldId id="276" r:id="rId15"/>
     <p:sldId id="277" r:id="rId16"/>
+    <p:sldId id="278" r:id="rId17"/>
+    <p:sldId id="279" r:id="rId18"/>
   </p:sldIdLst>
   <p:sldSz cx="12192000" cy="6858000"/>
   <p:notesSz cx="6858000" cy="9144000"/>
@@ -211,7 +213,7 @@
           <a:p>
             <a:fld id="{26EBCD72-B10C-4D2C-969F-84B0F9BCA715}" type="datetimeFigureOut">
               <a:rPr lang="en-US" smtClean="0"/>
-              <a:t>10/16/2019</a:t>
+              <a:t>10/20/2019</a:t>
             </a:fld>
             <a:endParaRPr lang="en-US"/>
           </a:p>
@@ -628,7 +630,7 @@
           <a:p>
             <a:fld id="{EBF18990-9ED1-4587-AF85-F892573A75B6}" type="datetimeFigureOut">
               <a:rPr lang="en-US" smtClean="0"/>
-              <a:t>10/16/2019</a:t>
+              <a:t>10/20/2019</a:t>
             </a:fld>
             <a:endParaRPr lang="en-US"/>
           </a:p>
@@ -828,7 +830,7 @@
           <a:p>
             <a:fld id="{EBF18990-9ED1-4587-AF85-F892573A75B6}" type="datetimeFigureOut">
               <a:rPr lang="en-US" smtClean="0"/>
-              <a:t>10/16/2019</a:t>
+              <a:t>10/20/2019</a:t>
             </a:fld>
             <a:endParaRPr lang="en-US"/>
           </a:p>
@@ -1038,7 +1040,7 @@
           <a:p>
             <a:fld id="{EBF18990-9ED1-4587-AF85-F892573A75B6}" type="datetimeFigureOut">
               <a:rPr lang="en-US" smtClean="0"/>
-              <a:t>10/16/2019</a:t>
+              <a:t>10/20/2019</a:t>
             </a:fld>
             <a:endParaRPr lang="en-US"/>
           </a:p>
@@ -1400,7 +1402,7 @@
           <a:p>
             <a:fld id="{EBF18990-9ED1-4587-AF85-F892573A75B6}" type="datetimeFigureOut">
               <a:rPr lang="en-US" smtClean="0"/>
-              <a:t>10/16/2019</a:t>
+              <a:t>10/20/2019</a:t>
             </a:fld>
             <a:endParaRPr lang="en-US"/>
           </a:p>
@@ -1676,7 +1678,7 @@
           <a:p>
             <a:fld id="{EBF18990-9ED1-4587-AF85-F892573A75B6}" type="datetimeFigureOut">
               <a:rPr lang="en-US" smtClean="0"/>
-              <a:t>10/16/2019</a:t>
+              <a:t>10/20/2019</a:t>
             </a:fld>
             <a:endParaRPr lang="en-US"/>
           </a:p>
@@ -1944,7 +1946,7 @@
           <a:p>
             <a:fld id="{EBF18990-9ED1-4587-AF85-F892573A75B6}" type="datetimeFigureOut">
               <a:rPr lang="en-US" smtClean="0"/>
-              <a:t>10/16/2019</a:t>
+              <a:t>10/20/2019</a:t>
             </a:fld>
             <a:endParaRPr lang="en-US"/>
           </a:p>
@@ -2359,7 +2361,7 @@
           <a:p>
             <a:fld id="{EBF18990-9ED1-4587-AF85-F892573A75B6}" type="datetimeFigureOut">
               <a:rPr lang="en-US" smtClean="0"/>
-              <a:t>10/16/2019</a:t>
+              <a:t>10/20/2019</a:t>
             </a:fld>
             <a:endParaRPr lang="en-US"/>
           </a:p>
@@ -2501,7 +2503,7 @@
           <a:p>
             <a:fld id="{EBF18990-9ED1-4587-AF85-F892573A75B6}" type="datetimeFigureOut">
               <a:rPr lang="en-US" smtClean="0"/>
-              <a:t>10/16/2019</a:t>
+              <a:t>10/20/2019</a:t>
             </a:fld>
             <a:endParaRPr lang="en-US"/>
           </a:p>
@@ -2614,7 +2616,7 @@
           <a:p>
             <a:fld id="{EBF18990-9ED1-4587-AF85-F892573A75B6}" type="datetimeFigureOut">
               <a:rPr lang="en-US" smtClean="0"/>
-              <a:t>10/16/2019</a:t>
+              <a:t>10/20/2019</a:t>
             </a:fld>
             <a:endParaRPr lang="en-US"/>
           </a:p>
@@ -2927,7 +2929,7 @@
           <a:p>
             <a:fld id="{EBF18990-9ED1-4587-AF85-F892573A75B6}" type="datetimeFigureOut">
               <a:rPr lang="en-US" smtClean="0"/>
-              <a:t>10/16/2019</a:t>
+              <a:t>10/20/2019</a:t>
             </a:fld>
             <a:endParaRPr lang="en-US"/>
           </a:p>
@@ -3216,7 +3218,7 @@
           <a:p>
             <a:fld id="{EBF18990-9ED1-4587-AF85-F892573A75B6}" type="datetimeFigureOut">
               <a:rPr lang="en-US" smtClean="0"/>
-              <a:t>10/16/2019</a:t>
+              <a:t>10/20/2019</a:t>
             </a:fld>
             <a:endParaRPr lang="en-US"/>
           </a:p>
@@ -3459,7 +3461,7 @@
           <a:p>
             <a:fld id="{EBF18990-9ED1-4587-AF85-F892573A75B6}" type="datetimeFigureOut">
               <a:rPr lang="en-US" smtClean="0"/>
-              <a:t>10/16/2019</a:t>
+              <a:t>10/20/2019</a:t>
             </a:fld>
             <a:endParaRPr lang="en-US"/>
           </a:p>
@@ -4908,6 +4910,485 @@
     <p:extLst>
       <p:ext uri="{BB962C8B-B14F-4D97-AF65-F5344CB8AC3E}">
         <p14:creationId xmlns:p14="http://schemas.microsoft.com/office/powerpoint/2010/main" val="2547622975"/>
+      </p:ext>
+    </p:extLst>
+  </p:cSld>
+  <p:clrMapOvr>
+    <a:masterClrMapping/>
+  </p:clrMapOvr>
+</p:sld>
+</file>
+
+<file path=ppt/slides/slide16.xml><?xml version="1.0" encoding="utf-8"?>
+<p:sld xmlns:a="http://schemas.openxmlformats.org/drawingml/2006/main" xmlns:r="http://schemas.openxmlformats.org/officeDocument/2006/relationships" xmlns:p="http://schemas.openxmlformats.org/presentationml/2006/main">
+  <p:cSld>
+    <p:spTree>
+      <p:nvGrpSpPr>
+        <p:cNvPr id="1" name=""/>
+        <p:cNvGrpSpPr/>
+        <p:nvPr/>
+      </p:nvGrpSpPr>
+      <p:grpSpPr>
+        <a:xfrm>
+          <a:off x="0" y="0"/>
+          <a:ext cx="0" cy="0"/>
+          <a:chOff x="0" y="0"/>
+          <a:chExt cx="0" cy="0"/>
+        </a:xfrm>
+      </p:grpSpPr>
+      <p:sp>
+        <p:nvSpPr>
+          <p:cNvPr id="4" name="Titel 1">
+            <a:extLst>
+              <a:ext uri="{FF2B5EF4-FFF2-40B4-BE49-F238E27FC236}">
+                <a16:creationId xmlns:a16="http://schemas.microsoft.com/office/drawing/2014/main" id="{9634F9A5-1EB6-4E1B-BAE0-4ECFAA114523}"/>
+              </a:ext>
+            </a:extLst>
+          </p:cNvPr>
+          <p:cNvSpPr>
+            <a:spLocks noGrp="1"/>
+          </p:cNvSpPr>
+          <p:nvPr>
+            <p:ph type="title"/>
+          </p:nvPr>
+        </p:nvSpPr>
+        <p:spPr>
+          <a:xfrm>
+            <a:off x="838200" y="365125"/>
+            <a:ext cx="10515600" cy="1325563"/>
+          </a:xfrm>
+        </p:spPr>
+        <p:txBody>
+          <a:bodyPr>
+            <a:normAutofit/>
+          </a:bodyPr>
+          <a:lstStyle/>
+          <a:p>
+            <a:r>
+              <a:rPr lang="en-US" dirty="0">
+                <a:latin typeface="+mj-lt"/>
+              </a:rPr>
+              <a:t>Assignment triangular number (10 min)</a:t>
+            </a:r>
+          </a:p>
+        </p:txBody>
+      </p:sp>
+      <p:sp>
+        <p:nvSpPr>
+          <p:cNvPr id="5" name="Tekstvak 4">
+            <a:extLst>
+              <a:ext uri="{FF2B5EF4-FFF2-40B4-BE49-F238E27FC236}">
+                <a16:creationId xmlns:a16="http://schemas.microsoft.com/office/drawing/2014/main" id="{14B68EEA-E9F2-4B3C-90BB-E1620DE74BF0}"/>
+              </a:ext>
+            </a:extLst>
+          </p:cNvPr>
+          <p:cNvSpPr txBox="1"/>
+          <p:nvPr/>
+        </p:nvSpPr>
+        <p:spPr>
+          <a:xfrm>
+            <a:off x="838200" y="1890944"/>
+            <a:ext cx="9738804" cy="2031325"/>
+          </a:xfrm>
+          <a:prstGeom prst="rect">
+            <a:avLst/>
+          </a:prstGeom>
+          <a:noFill/>
+        </p:spPr>
+        <p:txBody>
+          <a:bodyPr wrap="square" rtlCol="0">
+            <a:spAutoFit/>
+          </a:bodyPr>
+          <a:lstStyle/>
+          <a:p>
+            <a:pPr marL="285750" indent="-285750">
+              <a:buFont typeface="Arial" panose="020B0604020202020204" pitchFamily="34" charset="0"/>
+              <a:buChar char="•"/>
+            </a:pPr>
+            <a:r>
+              <a:rPr lang="en-US" dirty="0"/>
+              <a:t>This assignment is the same as the previous but now you need to figure something out yourself.</a:t>
+            </a:r>
+          </a:p>
+          <a:p>
+            <a:pPr marL="285750" indent="-285750">
+              <a:buFont typeface="Arial" panose="020B0604020202020204" pitchFamily="34" charset="0"/>
+              <a:buChar char="•"/>
+            </a:pPr>
+            <a:endParaRPr lang="en-US" dirty="0"/>
+          </a:p>
+          <a:p>
+            <a:pPr marL="285750" indent="-285750">
+              <a:buFont typeface="Arial" panose="020B0604020202020204" pitchFamily="34" charset="0"/>
+              <a:buChar char="•"/>
+            </a:pPr>
+            <a:r>
+              <a:rPr lang="en-US" dirty="0"/>
+              <a:t>Create a for loop that goes from 1 until the number given by the user.</a:t>
+            </a:r>
+          </a:p>
+          <a:p>
+            <a:pPr marL="285750" indent="-285750">
+              <a:buFont typeface="Arial" panose="020B0604020202020204" pitchFamily="34" charset="0"/>
+              <a:buChar char="•"/>
+            </a:pPr>
+            <a:r>
+              <a:rPr lang="en-US" dirty="0"/>
+              <a:t>So if the user gives 5 as in input the result must be:</a:t>
+            </a:r>
+          </a:p>
+          <a:p>
+            <a:pPr marL="742950" lvl="1" indent="-285750">
+              <a:buFont typeface="Arial" panose="020B0604020202020204" pitchFamily="34" charset="0"/>
+              <a:buChar char="•"/>
+            </a:pPr>
+            <a:r>
+              <a:rPr lang="en-US" dirty="0"/>
+              <a:t>1 + 2 + 3 + 4 + 5 = 15</a:t>
+            </a:r>
+          </a:p>
+          <a:p>
+            <a:pPr marL="742950" lvl="1" indent="-285750">
+              <a:buFont typeface="Arial" panose="020B0604020202020204" pitchFamily="34" charset="0"/>
+              <a:buChar char="•"/>
+            </a:pPr>
+            <a:r>
+              <a:rPr lang="en-US" dirty="0"/>
+              <a:t>15 should be printed</a:t>
+            </a:r>
+          </a:p>
+          <a:p>
+            <a:pPr marL="285750" indent="-285750">
+              <a:buFont typeface="Arial" panose="020B0604020202020204" pitchFamily="34" charset="0"/>
+              <a:buChar char="•"/>
+            </a:pPr>
+            <a:endParaRPr lang="en-US" dirty="0"/>
+          </a:p>
+        </p:txBody>
+      </p:sp>
+    </p:spTree>
+    <p:extLst>
+      <p:ext uri="{BB962C8B-B14F-4D97-AF65-F5344CB8AC3E}">
+        <p14:creationId xmlns:p14="http://schemas.microsoft.com/office/powerpoint/2010/main" val="3955872897"/>
+      </p:ext>
+    </p:extLst>
+  </p:cSld>
+  <p:clrMapOvr>
+    <a:masterClrMapping/>
+  </p:clrMapOvr>
+</p:sld>
+</file>
+
+<file path=ppt/slides/slide17.xml><?xml version="1.0" encoding="utf-8"?>
+<p:sld xmlns:a="http://schemas.openxmlformats.org/drawingml/2006/main" xmlns:r="http://schemas.openxmlformats.org/officeDocument/2006/relationships" xmlns:p="http://schemas.openxmlformats.org/presentationml/2006/main">
+  <p:cSld>
+    <p:spTree>
+      <p:nvGrpSpPr>
+        <p:cNvPr id="1" name=""/>
+        <p:cNvGrpSpPr/>
+        <p:nvPr/>
+      </p:nvGrpSpPr>
+      <p:grpSpPr>
+        <a:xfrm>
+          <a:off x="0" y="0"/>
+          <a:ext cx="0" cy="0"/>
+          <a:chOff x="0" y="0"/>
+          <a:chExt cx="0" cy="0"/>
+        </a:xfrm>
+      </p:grpSpPr>
+      <p:sp>
+        <p:nvSpPr>
+          <p:cNvPr id="4" name="Tijdelijke aanduiding voor inhoud 2">
+            <a:extLst>
+              <a:ext uri="{FF2B5EF4-FFF2-40B4-BE49-F238E27FC236}">
+                <a16:creationId xmlns:a16="http://schemas.microsoft.com/office/drawing/2014/main" id="{DAFA2BF8-03DA-4833-A8C7-253038A569DC}"/>
+              </a:ext>
+            </a:extLst>
+          </p:cNvPr>
+          <p:cNvSpPr txBox="1">
+            <a:spLocks/>
+          </p:cNvSpPr>
+          <p:nvPr/>
+        </p:nvSpPr>
+        <p:spPr>
+          <a:xfrm>
+            <a:off x="838200" y="1825625"/>
+            <a:ext cx="10515600" cy="4351338"/>
+          </a:xfrm>
+          <a:prstGeom prst="rect">
+            <a:avLst/>
+          </a:prstGeom>
+        </p:spPr>
+        <p:txBody>
+          <a:bodyPr/>
+          <a:lstStyle>
+            <a:lvl1pPr marL="228600" indent="-228600" algn="l" defTabSz="914400" rtl="0" eaLnBrk="1" latinLnBrk="0" hangingPunct="1">
+              <a:lnSpc>
+                <a:spcPct val="90000"/>
+              </a:lnSpc>
+              <a:spcBef>
+                <a:spcPts val="1000"/>
+              </a:spcBef>
+              <a:buFont typeface="Arial" panose="020B0604020202020204" pitchFamily="34" charset="0"/>
+              <a:buChar char="•"/>
+              <a:defRPr sz="2800" kern="1200">
+                <a:solidFill>
+                  <a:schemeClr val="tx1"/>
+                </a:solidFill>
+                <a:latin typeface="+mn-lt"/>
+                <a:ea typeface="+mn-ea"/>
+                <a:cs typeface="+mn-cs"/>
+              </a:defRPr>
+            </a:lvl1pPr>
+            <a:lvl2pPr marL="685800" indent="-228600" algn="l" defTabSz="914400" rtl="0" eaLnBrk="1" latinLnBrk="0" hangingPunct="1">
+              <a:lnSpc>
+                <a:spcPct val="90000"/>
+              </a:lnSpc>
+              <a:spcBef>
+                <a:spcPts val="500"/>
+              </a:spcBef>
+              <a:buFont typeface="Arial" panose="020B0604020202020204" pitchFamily="34" charset="0"/>
+              <a:buChar char="•"/>
+              <a:defRPr sz="2400" kern="1200">
+                <a:solidFill>
+                  <a:schemeClr val="tx1"/>
+                </a:solidFill>
+                <a:latin typeface="+mn-lt"/>
+                <a:ea typeface="+mn-ea"/>
+                <a:cs typeface="+mn-cs"/>
+              </a:defRPr>
+            </a:lvl2pPr>
+            <a:lvl3pPr marL="1143000" indent="-228600" algn="l" defTabSz="914400" rtl="0" eaLnBrk="1" latinLnBrk="0" hangingPunct="1">
+              <a:lnSpc>
+                <a:spcPct val="90000"/>
+              </a:lnSpc>
+              <a:spcBef>
+                <a:spcPts val="500"/>
+              </a:spcBef>
+              <a:buFont typeface="Arial" panose="020B0604020202020204" pitchFamily="34" charset="0"/>
+              <a:buChar char="•"/>
+              <a:defRPr sz="2000" kern="1200">
+                <a:solidFill>
+                  <a:schemeClr val="tx1"/>
+                </a:solidFill>
+                <a:latin typeface="+mn-lt"/>
+                <a:ea typeface="+mn-ea"/>
+                <a:cs typeface="+mn-cs"/>
+              </a:defRPr>
+            </a:lvl3pPr>
+            <a:lvl4pPr marL="1600200" indent="-228600" algn="l" defTabSz="914400" rtl="0" eaLnBrk="1" latinLnBrk="0" hangingPunct="1">
+              <a:lnSpc>
+                <a:spcPct val="90000"/>
+              </a:lnSpc>
+              <a:spcBef>
+                <a:spcPts val="500"/>
+              </a:spcBef>
+              <a:buFont typeface="Arial" panose="020B0604020202020204" pitchFamily="34" charset="0"/>
+              <a:buChar char="•"/>
+              <a:defRPr sz="1800" kern="1200">
+                <a:solidFill>
+                  <a:schemeClr val="tx1"/>
+                </a:solidFill>
+                <a:latin typeface="+mn-lt"/>
+                <a:ea typeface="+mn-ea"/>
+                <a:cs typeface="+mn-cs"/>
+              </a:defRPr>
+            </a:lvl4pPr>
+            <a:lvl5pPr marL="2057400" indent="-228600" algn="l" defTabSz="914400" rtl="0" eaLnBrk="1" latinLnBrk="0" hangingPunct="1">
+              <a:lnSpc>
+                <a:spcPct val="90000"/>
+              </a:lnSpc>
+              <a:spcBef>
+                <a:spcPts val="500"/>
+              </a:spcBef>
+              <a:buFont typeface="Arial" panose="020B0604020202020204" pitchFamily="34" charset="0"/>
+              <a:buChar char="•"/>
+              <a:defRPr sz="1800" kern="1200">
+                <a:solidFill>
+                  <a:schemeClr val="tx1"/>
+                </a:solidFill>
+                <a:latin typeface="+mn-lt"/>
+                <a:ea typeface="+mn-ea"/>
+                <a:cs typeface="+mn-cs"/>
+              </a:defRPr>
+            </a:lvl5pPr>
+            <a:lvl6pPr marL="2514600" indent="-228600" algn="l" defTabSz="914400" rtl="0" eaLnBrk="1" latinLnBrk="0" hangingPunct="1">
+              <a:lnSpc>
+                <a:spcPct val="90000"/>
+              </a:lnSpc>
+              <a:spcBef>
+                <a:spcPts val="500"/>
+              </a:spcBef>
+              <a:buFont typeface="Arial" panose="020B0604020202020204" pitchFamily="34" charset="0"/>
+              <a:buChar char="•"/>
+              <a:defRPr sz="1800" kern="1200">
+                <a:solidFill>
+                  <a:schemeClr val="tx1"/>
+                </a:solidFill>
+                <a:latin typeface="+mn-lt"/>
+                <a:ea typeface="+mn-ea"/>
+                <a:cs typeface="+mn-cs"/>
+              </a:defRPr>
+            </a:lvl6pPr>
+            <a:lvl7pPr marL="2971800" indent="-228600" algn="l" defTabSz="914400" rtl="0" eaLnBrk="1" latinLnBrk="0" hangingPunct="1">
+              <a:lnSpc>
+                <a:spcPct val="90000"/>
+              </a:lnSpc>
+              <a:spcBef>
+                <a:spcPts val="500"/>
+              </a:spcBef>
+              <a:buFont typeface="Arial" panose="020B0604020202020204" pitchFamily="34" charset="0"/>
+              <a:buChar char="•"/>
+              <a:defRPr sz="1800" kern="1200">
+                <a:solidFill>
+                  <a:schemeClr val="tx1"/>
+                </a:solidFill>
+                <a:latin typeface="+mn-lt"/>
+                <a:ea typeface="+mn-ea"/>
+                <a:cs typeface="+mn-cs"/>
+              </a:defRPr>
+            </a:lvl7pPr>
+            <a:lvl8pPr marL="3429000" indent="-228600" algn="l" defTabSz="914400" rtl="0" eaLnBrk="1" latinLnBrk="0" hangingPunct="1">
+              <a:lnSpc>
+                <a:spcPct val="90000"/>
+              </a:lnSpc>
+              <a:spcBef>
+                <a:spcPts val="500"/>
+              </a:spcBef>
+              <a:buFont typeface="Arial" panose="020B0604020202020204" pitchFamily="34" charset="0"/>
+              <a:buChar char="•"/>
+              <a:defRPr sz="1800" kern="1200">
+                <a:solidFill>
+                  <a:schemeClr val="tx1"/>
+                </a:solidFill>
+                <a:latin typeface="+mn-lt"/>
+                <a:ea typeface="+mn-ea"/>
+                <a:cs typeface="+mn-cs"/>
+              </a:defRPr>
+            </a:lvl8pPr>
+            <a:lvl9pPr marL="3886200" indent="-228600" algn="l" defTabSz="914400" rtl="0" eaLnBrk="1" latinLnBrk="0" hangingPunct="1">
+              <a:lnSpc>
+                <a:spcPct val="90000"/>
+              </a:lnSpc>
+              <a:spcBef>
+                <a:spcPts val="500"/>
+              </a:spcBef>
+              <a:buFont typeface="Arial" panose="020B0604020202020204" pitchFamily="34" charset="0"/>
+              <a:buChar char="•"/>
+              <a:defRPr sz="1800" kern="1200">
+                <a:solidFill>
+                  <a:schemeClr val="tx1"/>
+                </a:solidFill>
+                <a:latin typeface="+mn-lt"/>
+                <a:ea typeface="+mn-ea"/>
+                <a:cs typeface="+mn-cs"/>
+              </a:defRPr>
+            </a:lvl9pPr>
+          </a:lstStyle>
+          <a:p>
+            <a:r>
+              <a:rPr lang="en-US" dirty="0" err="1">
+                <a:solidFill>
+                  <a:srgbClr val="800080"/>
+                </a:solidFill>
+              </a:rPr>
+              <a:t>elif</a:t>
+            </a:r>
+            <a:r>
+              <a:rPr lang="en-US" dirty="0">
+                <a:solidFill>
+                  <a:srgbClr val="800080"/>
+                </a:solidFill>
+              </a:rPr>
+              <a:t> </a:t>
+            </a:r>
+            <a:r>
+              <a:rPr lang="en-US" dirty="0"/>
+              <a:t>statement</a:t>
+            </a:r>
+          </a:p>
+          <a:p>
+            <a:r>
+              <a:rPr lang="en-US" dirty="0"/>
+              <a:t>variable += “string” / += 1</a:t>
+            </a:r>
+          </a:p>
+          <a:p>
+            <a:r>
+              <a:rPr lang="en-US" dirty="0">
+                <a:solidFill>
+                  <a:srgbClr val="800080"/>
+                </a:solidFill>
+              </a:rPr>
+              <a:t>for</a:t>
+            </a:r>
+            <a:r>
+              <a:rPr lang="en-US" dirty="0"/>
+              <a:t> loop</a:t>
+            </a:r>
+          </a:p>
+          <a:p>
+            <a:r>
+              <a:rPr lang="en-US" dirty="0"/>
+              <a:t>How to google a problem</a:t>
+            </a:r>
+          </a:p>
+          <a:p>
+            <a:endParaRPr lang="en-US" dirty="0"/>
+          </a:p>
+          <a:p>
+            <a:r>
+              <a:rPr lang="en-US" dirty="0"/>
+              <a:t>Created a simple calculator</a:t>
+            </a:r>
+          </a:p>
+          <a:p>
+            <a:r>
+              <a:rPr lang="en-US" dirty="0"/>
+              <a:t>Created a for loop that calculates a triangular number</a:t>
+            </a:r>
+          </a:p>
+        </p:txBody>
+      </p:sp>
+      <p:sp>
+        <p:nvSpPr>
+          <p:cNvPr id="5" name="Titel 1">
+            <a:extLst>
+              <a:ext uri="{FF2B5EF4-FFF2-40B4-BE49-F238E27FC236}">
+                <a16:creationId xmlns:a16="http://schemas.microsoft.com/office/drawing/2014/main" id="{A7CE0CFB-EBB2-4F24-8FEE-BA1C8A8EF32C}"/>
+              </a:ext>
+            </a:extLst>
+          </p:cNvPr>
+          <p:cNvSpPr>
+            <a:spLocks noGrp="1"/>
+          </p:cNvSpPr>
+          <p:nvPr>
+            <p:ph type="title"/>
+          </p:nvPr>
+        </p:nvSpPr>
+        <p:spPr>
+          <a:xfrm>
+            <a:off x="838200" y="365125"/>
+            <a:ext cx="10515600" cy="1325563"/>
+          </a:xfrm>
+        </p:spPr>
+        <p:txBody>
+          <a:bodyPr/>
+          <a:lstStyle/>
+          <a:p>
+            <a:r>
+              <a:rPr lang="en-US" dirty="0">
+                <a:latin typeface="+mj-lt"/>
+              </a:rPr>
+              <a:t>Summary</a:t>
+            </a:r>
+          </a:p>
+        </p:txBody>
+      </p:sp>
+    </p:spTree>
+    <p:extLst>
+      <p:ext uri="{BB962C8B-B14F-4D97-AF65-F5344CB8AC3E}">
+        <p14:creationId xmlns:p14="http://schemas.microsoft.com/office/powerpoint/2010/main" val="1031968100"/>
       </p:ext>
     </p:extLst>
   </p:cSld>

</xml_diff>